<commit_message>
Change presenter name to Drew Smith
</commit_message>
<xml_diff>
--- a/business_plan/MatchForge_Presentation.pptx
+++ b/business_plan/MatchForge_Presentation.pptx
@@ -3561,11 +3561,11 @@
               </a:defRPr>
             </a:pPr>
             <a:r>
-              <a:t>Jeremy Smith</a:t>
+              <a:t>Drew Smith</a:t>
             </a:r>
             <a:br/>
             <a:r>
-              <a:t>jerm71279@gmail.com</a:t>
+              <a:t>drew.smith@email.com</a:t>
             </a:r>
             <a:br/>
             <a:r>

</xml_diff>

<commit_message>
Remove costs from business plan and presentation
</commit_message>
<xml_diff>
--- a/business_plan/MatchForge_Presentation.pptx
+++ b/business_plan/MatchForge_Presentation.pptx
@@ -16,7 +16,6 @@
     <p:sldId id="264" r:id="rId15"/>
     <p:sldId id="265" r:id="rId16"/>
     <p:sldId id="266" r:id="rId17"/>
-    <p:sldId id="267" r:id="rId18"/>
   </p:sldIdLst>
   <p:sldSz cx="12191695" cy="6858000" type="screen4x3"/>
   <p:notesSz cx="6858000" cy="9144000"/>
@@ -3221,7 +3220,7 @@
               </a:defRPr>
             </a:pPr>
             <a:r>
-              <a:t>Live Demo</a:t>
+              <a:t>Development Roadmap</a:t>
             </a:r>
           </a:p>
         </p:txBody>
@@ -3255,7 +3254,7 @@
               <a:defRPr sz="2400"/>
             </a:pPr>
             <a:r>
-              <a:t>• 1. Profile setup with resume auto-fill</a:t>
+              <a:t>• Phase 1 (Complete): Core matching, ATS checker, coaching chat</a:t>
             </a:r>
           </a:p>
           <a:p>
@@ -3265,9 +3264,6 @@
               </a:spcAft>
               <a:defRPr sz="2400"/>
             </a:pPr>
-            <a:r>
-              <a:t>• 2. Job search with real APIs (The Muse)</a:t>
-            </a:r>
           </a:p>
           <a:p>
             <a:pPr>
@@ -3277,7 +3273,7 @@
               <a:defRPr sz="2400"/>
             </a:pPr>
             <a:r>
-              <a:t>• 3. "Check My Fit" - single job skill comparison</a:t>
+              <a:t>• Phase 2 (Complete): Profile UI, LLM parsing, skill gaps, AI coach</a:t>
             </a:r>
           </a:p>
           <a:p>
@@ -3287,9 +3283,6 @@
               </a:spcAft>
               <a:defRPr sz="2400"/>
             </a:pPr>
-            <a:r>
-              <a:t>• 4. "Analyze Skill Gaps" - market-wide demand</a:t>
-            </a:r>
           </a:p>
           <a:p>
             <a:pPr>
@@ -3299,7 +3292,7 @@
               <a:defRPr sz="2400"/>
             </a:pPr>
             <a:r>
-              <a:t>• 5. AI Career Coach - instant advice</a:t>
+              <a:t>• Phase 3 (Planned): Match explanations, career path prediction</a:t>
             </a:r>
           </a:p>
           <a:p>
@@ -3318,18 +3311,7 @@
               <a:defRPr sz="2400"/>
             </a:pPr>
             <a:r>
-              <a:t>• Demo: http://localhost:8001/demo</a:t>
-            </a:r>
-          </a:p>
-          <a:p>
-            <a:pPr>
-              <a:spcAft>
-                <a:spcPts val="1200"/>
-              </a:spcAft>
-              <a:defRPr sz="2400"/>
-            </a:pPr>
-            <a:r>
-              <a:t>• Login: demo@matchforge.com / DemoPass123</a:t>
+              <a:t>• Phase 4 (Future): Interview simulation, bias detection</a:t>
             </a:r>
           </a:p>
         </p:txBody>
@@ -3360,150 +3342,6 @@
         </p:nvSpPr>
         <p:spPr>
           <a:xfrm>
-            <a:off x="457200" y="365760"/>
-            <a:ext cx="11277295" cy="914400"/>
-          </a:xfrm>
-          <a:prstGeom prst="rect">
-            <a:avLst/>
-          </a:prstGeom>
-          <a:noFill/>
-        </p:spPr>
-        <p:txBody>
-          <a:bodyPr wrap="none">
-            <a:spAutoFit/>
-          </a:bodyPr>
-          <a:lstStyle/>
-          <a:p>
-            <a:pPr>
-              <a:defRPr sz="4000" b="1">
-                <a:solidFill>
-                  <a:srgbClr val="0066CC"/>
-                </a:solidFill>
-              </a:defRPr>
-            </a:pPr>
-            <a:r>
-              <a:t>Development Roadmap</a:t>
-            </a:r>
-          </a:p>
-        </p:txBody>
-      </p:sp>
-      <p:sp>
-        <p:nvSpPr>
-          <p:cNvPr id="3" name="TextBox 2"/>
-          <p:cNvSpPr txBox="1"/>
-          <p:nvPr/>
-        </p:nvSpPr>
-        <p:spPr>
-          <a:xfrm>
-            <a:off x="640080" y="1371600"/>
-            <a:ext cx="10972800" cy="5029200"/>
-          </a:xfrm>
-          <a:prstGeom prst="rect">
-            <a:avLst/>
-          </a:prstGeom>
-          <a:noFill/>
-        </p:spPr>
-        <p:txBody>
-          <a:bodyPr wrap="square">
-            <a:spAutoFit/>
-          </a:bodyPr>
-          <a:lstStyle/>
-          <a:p>
-            <a:pPr>
-              <a:spcAft>
-                <a:spcPts val="1200"/>
-              </a:spcAft>
-              <a:defRPr sz="2400"/>
-            </a:pPr>
-            <a:r>
-              <a:t>• Phase 1 (Complete): Core matching, ATS checker, coaching chat</a:t>
-            </a:r>
-          </a:p>
-          <a:p>
-            <a:pPr>
-              <a:spcAft>
-                <a:spcPts val="1200"/>
-              </a:spcAft>
-              <a:defRPr sz="2400"/>
-            </a:pPr>
-          </a:p>
-          <a:p>
-            <a:pPr>
-              <a:spcAft>
-                <a:spcPts val="1200"/>
-              </a:spcAft>
-              <a:defRPr sz="2400"/>
-            </a:pPr>
-            <a:r>
-              <a:t>• Phase 2 (Complete): Profile UI, LLM parsing, skill gaps, AI coach</a:t>
-            </a:r>
-          </a:p>
-          <a:p>
-            <a:pPr>
-              <a:spcAft>
-                <a:spcPts val="1200"/>
-              </a:spcAft>
-              <a:defRPr sz="2400"/>
-            </a:pPr>
-          </a:p>
-          <a:p>
-            <a:pPr>
-              <a:spcAft>
-                <a:spcPts val="1200"/>
-              </a:spcAft>
-              <a:defRPr sz="2400"/>
-            </a:pPr>
-            <a:r>
-              <a:t>• Phase 3 (Planned): Match explanations, career path prediction</a:t>
-            </a:r>
-          </a:p>
-          <a:p>
-            <a:pPr>
-              <a:spcAft>
-                <a:spcPts val="1200"/>
-              </a:spcAft>
-              <a:defRPr sz="2400"/>
-            </a:pPr>
-          </a:p>
-          <a:p>
-            <a:pPr>
-              <a:spcAft>
-                <a:spcPts val="1200"/>
-              </a:spcAft>
-              <a:defRPr sz="2400"/>
-            </a:pPr>
-            <a:r>
-              <a:t>• Phase 4 (Future): Interview simulation, bias detection</a:t>
-            </a:r>
-          </a:p>
-        </p:txBody>
-      </p:sp>
-    </p:spTree>
-  </p:cSld>
-  <p:clrMapOvr>
-    <a:masterClrMapping/>
-  </p:clrMapOvr>
-</p:sld>
-</file>
-
-<file path=ppt/slides/slide12.xml><?xml version="1.0" encoding="utf-8"?>
-<p:sld xmlns:a="http://schemas.openxmlformats.org/drawingml/2006/main" xmlns:p="http://schemas.openxmlformats.org/presentationml/2006/main" xmlns:r="http://schemas.openxmlformats.org/officeDocument/2006/relationships">
-  <p:cSld>
-    <p:spTree>
-      <p:nvGrpSpPr>
-        <p:cNvPr id="1" name=""/>
-        <p:cNvGrpSpPr/>
-        <p:nvPr/>
-      </p:nvGrpSpPr>
-      <p:grpSpPr/>
-      <p:sp>
-        <p:nvSpPr>
-          <p:cNvPr id="2" name="TextBox 1"/>
-          <p:cNvSpPr txBox="1"/>
-          <p:nvPr/>
-        </p:nvSpPr>
-        <p:spPr>
-          <a:xfrm>
             <a:off x="457200" y="2286000"/>
             <a:ext cx="11277295" cy="1371600"/>
           </a:xfrm>
@@ -3562,10 +3400,6 @@
             </a:pPr>
             <a:r>
               <a:t>Drew Smith</a:t>
-            </a:r>
-            <a:br/>
-            <a:r>
-              <a:t>drew.smith@email.com</a:t>
             </a:r>
             <a:br/>
             <a:r>
@@ -3692,17 +3526,6 @@
               <a:t>• LinkedIn shows skill gaps per job, but doesn't aggregate market demand</a:t>
             </a:r>
           </a:p>
-          <a:p>
-            <a:pPr>
-              <a:spcAft>
-                <a:spcPts val="1200"/>
-              </a:spcAft>
-              <a:defRPr sz="2400"/>
-            </a:pPr>
-            <a:r>
-              <a:t>• Career coaching is expensive ($199-$1,099 per session)</a:t>
-            </a:r>
-          </a:p>
         </p:txBody>
       </p:sp>
     </p:spTree>
@@ -3831,7 +3654,7 @@
               <a:defRPr sz="2400"/>
             </a:pPr>
             <a:r>
-              <a:t>• Human coaching at accessible prices</a:t>
+              <a:t>• Human coaching for personalized advice</a:t>
             </a:r>
           </a:p>
         </p:txBody>
@@ -4877,7 +4700,7 @@
               <a:defRPr sz="2400"/>
             </a:pPr>
             <a:r>
-              <a:t>• Real-time WebSocket chat with human coaches</a:t>
+              <a:t>• Real-time chat with human coaches</a:t>
             </a:r>
           </a:p>
         </p:txBody>
@@ -5010,7 +4833,7 @@
               <a:defRPr sz="2000"/>
             </a:pPr>
             <a:r>
-              <a:t>• PostgreSQL + Redis</a:t>
+              <a:t>• PostgreSQL database</a:t>
             </a:r>
           </a:p>
           <a:p>
@@ -5209,7 +5032,7 @@
               </a:defRPr>
             </a:pPr>
             <a:r>
-              <a:t>Business Model</a:t>
+              <a:t>Live Demo</a:t>
             </a:r>
           </a:p>
         </p:txBody>
@@ -5243,7 +5066,7 @@
               <a:defRPr sz="2400"/>
             </a:pPr>
             <a:r>
-              <a:t>• Freemium model with Pro tier ($19/month)</a:t>
+              <a:t>• 1. Profile setup with resume auto-fill</a:t>
             </a:r>
           </a:p>
           <a:p>
@@ -5253,6 +5076,9 @@
               </a:spcAft>
               <a:defRPr sz="2400"/>
             </a:pPr>
+            <a:r>
+              <a:t>• 2. Job search with real APIs (The Muse)</a:t>
+            </a:r>
           </a:p>
           <a:p>
             <a:pPr>
@@ -5262,7 +5088,7 @@
               <a:defRPr sz="2400"/>
             </a:pPr>
             <a:r>
-              <a:t>• Free Tier:</a:t>
+              <a:t>• 3. "Check My Fit" - single job skill comparison</a:t>
             </a:r>
           </a:p>
           <a:p>
@@ -5273,7 +5099,7 @@
               <a:defRPr sz="2400"/>
             </a:pPr>
             <a:r>
-              <a:t>•     5 job matches/day, basic ATS check, limited AI coach</a:t>
+              <a:t>• 4. "Analyze Skill Gaps" - market-wide demand</a:t>
             </a:r>
           </a:p>
           <a:p>
@@ -5283,6 +5109,9 @@
               </a:spcAft>
               <a:defRPr sz="2400"/>
             </a:pPr>
+            <a:r>
+              <a:t>• 5. AI Career Coach - instant advice</a:t>
+            </a:r>
           </a:p>
           <a:p>
             <a:pPr>
@@ -5291,9 +5120,6 @@
               </a:spcAft>
               <a:defRPr sz="2400"/>
             </a:pPr>
-            <a:r>
-              <a:t>• Pro Tier:</a:t>
-            </a:r>
           </a:p>
           <a:p>
             <a:pPr>
@@ -5303,7 +5129,7 @@
               <a:defRPr sz="2400"/>
             </a:pPr>
             <a:r>
-              <a:t>•     Unlimited matches, full skill gap analysis, priority coaching</a:t>
+              <a:t>• Demo: http://localhost:8001/demo</a:t>
             </a:r>
           </a:p>
           <a:p>
@@ -5313,16 +5139,8 @@
               </a:spcAft>
               <a:defRPr sz="2400"/>
             </a:pPr>
-          </a:p>
-          <a:p>
-            <a:pPr>
-              <a:spcAft>
-                <a:spcPts val="1200"/>
-              </a:spcAft>
-              <a:defRPr sz="2400"/>
-            </a:pPr>
-            <a:r>
-              <a:t>• AI costs: ~$35/month per 1,000 users (&lt;5% of revenue)</a:t>
+            <a:r>
+              <a:t>• Login: demo@matchforge.com / DemoPass123</a:t>
             </a:r>
           </a:p>
         </p:txBody>

</xml_diff>